<commit_message>
added new sql commands
</commit_message>
<xml_diff>
--- a/IIHT-Capgemini Big Data Azure Training-Slide.pptx
+++ b/IIHT-Capgemini Big Data Azure Training-Slide.pptx
@@ -5,7 +5,7 @@
     <p:sldMasterId id="2147483659" r:id="rId1"/>
   </p:sldMasterIdLst>
   <p:notesMasterIdLst>
-    <p:notesMasterId r:id="rId91"/>
+    <p:notesMasterId r:id="rId92"/>
   </p:notesMasterIdLst>
   <p:sldIdLst>
     <p:sldId id="256" r:id="rId2"/>
@@ -97,16 +97,17 @@
     <p:sldId id="335" r:id="rId88"/>
     <p:sldId id="336" r:id="rId89"/>
     <p:sldId id="337" r:id="rId90"/>
+    <p:sldId id="345" r:id="rId91"/>
   </p:sldIdLst>
   <p:sldSz cx="9144000" cy="5143500" type="screen16x9"/>
   <p:notesSz cx="6858000" cy="9144000"/>
   <p:embeddedFontLst>
     <p:embeddedFont>
       <p:font typeface="Roboto" panose="02000000000000000000" pitchFamily="2" charset="0"/>
-      <p:regular r:id="rId92"/>
-      <p:bold r:id="rId93"/>
-      <p:italic r:id="rId94"/>
-      <p:boldItalic r:id="rId95"/>
+      <p:regular r:id="rId93"/>
+      <p:bold r:id="rId94"/>
+      <p:italic r:id="rId95"/>
+      <p:boldItalic r:id="rId96"/>
     </p:embeddedFont>
   </p:embeddedFontLst>
   <p:defaultTextStyle>
@@ -14280,7 +14281,7 @@
         </p:spPr>
         <p:txBody>
           <a:bodyPr spcFirstLastPara="1" wrap="square" lIns="91425" tIns="91425" rIns="91425" bIns="91425" anchor="t" anchorCtr="0">
-            <a:normAutofit fontScale="92500"/>
+            <a:normAutofit fontScale="92500" lnSpcReduction="20000"/>
           </a:bodyPr>
           <a:lstStyle/>
           <a:p>
@@ -14831,10 +14832,10 @@
               <a:buNone/>
             </a:pPr>
             <a:r>
-              <a:rPr lang="en-GB"/>
+              <a:rPr lang="en-GB" dirty="0"/>
               <a:t>Relational Model</a:t>
             </a:r>
-            <a:endParaRPr/>
+            <a:endParaRPr dirty="0"/>
           </a:p>
         </p:txBody>
       </p:sp>
@@ -24679,10 +24680,10 @@
               <a:buChar char="●"/>
             </a:pPr>
             <a:r>
-              <a:rPr lang="en-GB"/>
+              <a:rPr lang="en-GB" dirty="0"/>
               <a:t>ALTER DATABASE - Modifies a database </a:t>
             </a:r>
-            <a:endParaRPr/>
+            <a:endParaRPr dirty="0"/>
           </a:p>
           <a:p>
             <a:pPr marL="457200" lvl="0" indent="-342900" algn="l" rtl="0">
@@ -24696,10 +24697,10 @@
               <a:buChar char="●"/>
             </a:pPr>
             <a:r>
-              <a:rPr lang="en-GB"/>
+              <a:rPr lang="en-GB" dirty="0"/>
               <a:t>CREATE TABLE - Creates a new table</a:t>
             </a:r>
-            <a:endParaRPr/>
+            <a:endParaRPr dirty="0"/>
           </a:p>
           <a:p>
             <a:pPr marL="457200" lvl="0" indent="-342900" algn="l" rtl="0">
@@ -24713,10 +24714,10 @@
               <a:buChar char="●"/>
             </a:pPr>
             <a:r>
-              <a:rPr lang="en-GB"/>
+              <a:rPr lang="en-GB" dirty="0"/>
               <a:t>ALTER TABLE - modifies a table</a:t>
             </a:r>
-            <a:endParaRPr/>
+            <a:endParaRPr dirty="0"/>
           </a:p>
           <a:p>
             <a:pPr marL="457200" lvl="0" indent="-342900" algn="l" rtl="0">
@@ -24730,10 +24731,10 @@
               <a:buChar char="●"/>
             </a:pPr>
             <a:r>
-              <a:rPr lang="en-GB"/>
+              <a:rPr lang="en-GB" dirty="0"/>
               <a:t>DROP TABLE - deletes a table</a:t>
             </a:r>
-            <a:endParaRPr/>
+            <a:endParaRPr dirty="0"/>
           </a:p>
           <a:p>
             <a:pPr marL="457200" lvl="0" indent="-342900" algn="l" rtl="0">
@@ -24747,10 +24748,10 @@
               <a:buChar char="●"/>
             </a:pPr>
             <a:r>
-              <a:rPr lang="en-GB"/>
+              <a:rPr lang="en-GB" dirty="0"/>
               <a:t>TRUNCATE TABLE - deletes the data inside the table. But not the table itself</a:t>
             </a:r>
-            <a:endParaRPr/>
+            <a:endParaRPr dirty="0"/>
           </a:p>
           <a:p>
             <a:pPr marL="457200" lvl="0" indent="-342900" algn="l" rtl="0">
@@ -24764,14 +24765,30 @@
               <a:buChar char="●"/>
             </a:pPr>
             <a:r>
-              <a:rPr lang="en-GB"/>
+              <a:rPr lang="en-GB" dirty="0"/>
               <a:t>RENAME TABLE (TSQL) - </a:t>
             </a:r>
             <a:r>
-              <a:rPr lang="en-GB" sz="1200"/>
-              <a:t>This example renames the SQL table from “SalesTerritory” to “SalesTerr” in Sales schema. </a:t>
-            </a:r>
-            <a:endParaRPr sz="1200"/>
+              <a:rPr lang="en-GB" sz="1200" dirty="0"/>
+              <a:t>This example renames the SQL table from “</a:t>
+            </a:r>
+            <a:r>
+              <a:rPr lang="en-GB" sz="1200" dirty="0" err="1"/>
+              <a:t>SalesTerritory</a:t>
+            </a:r>
+            <a:r>
+              <a:rPr lang="en-GB" sz="1200" dirty="0"/>
+              <a:t>” to “</a:t>
+            </a:r>
+            <a:r>
+              <a:rPr lang="en-GB" sz="1200" dirty="0" err="1"/>
+              <a:t>SalesTerr</a:t>
+            </a:r>
+            <a:r>
+              <a:rPr lang="en-GB" sz="1200" dirty="0"/>
+              <a:t>” in Sales schema. </a:t>
+            </a:r>
+            <a:endParaRPr sz="1200" dirty="0"/>
           </a:p>
           <a:p>
             <a:pPr marL="457200" lvl="0" indent="0" algn="l" rtl="0">
@@ -24784,10 +24801,10 @@
               <a:buNone/>
             </a:pPr>
             <a:r>
-              <a:rPr lang="en-GB" sz="1200"/>
+              <a:rPr lang="en-GB" sz="1200" dirty="0"/>
               <a:t>USE AdventureWorks2012;</a:t>
             </a:r>
-            <a:endParaRPr sz="1200"/>
+            <a:endParaRPr sz="1200" dirty="0"/>
           </a:p>
           <a:p>
             <a:pPr marL="457200" lvl="0" indent="0" algn="l" rtl="0">
@@ -24800,10 +24817,10 @@
               <a:buNone/>
             </a:pPr>
             <a:r>
-              <a:rPr lang="en-GB" sz="1200"/>
+              <a:rPr lang="en-GB" sz="1200" dirty="0"/>
               <a:t>GO</a:t>
             </a:r>
-            <a:endParaRPr sz="1200"/>
+            <a:endParaRPr sz="1200" dirty="0"/>
           </a:p>
           <a:p>
             <a:pPr marL="457200" lvl="0" indent="0" algn="l" rtl="0">
@@ -24816,10 +24833,34 @@
               <a:buNone/>
             </a:pPr>
             <a:r>
-              <a:rPr lang="en-GB" sz="1200"/>
-              <a:t>EXEC sp_rename 'Sales.SalesTerritory', 'SalesTerr';</a:t>
-            </a:r>
-            <a:endParaRPr sz="1200"/>
+              <a:rPr lang="en-GB" sz="1200" dirty="0"/>
+              <a:t>EXEC </a:t>
+            </a:r>
+            <a:r>
+              <a:rPr lang="en-GB" sz="1200" dirty="0" err="1"/>
+              <a:t>sp_rename</a:t>
+            </a:r>
+            <a:r>
+              <a:rPr lang="en-GB" sz="1200" dirty="0"/>
+              <a:t> '</a:t>
+            </a:r>
+            <a:r>
+              <a:rPr lang="en-GB" sz="1200" dirty="0" err="1"/>
+              <a:t>Sales.SalesTerritory</a:t>
+            </a:r>
+            <a:r>
+              <a:rPr lang="en-GB" sz="1200" dirty="0"/>
+              <a:t>', '</a:t>
+            </a:r>
+            <a:r>
+              <a:rPr lang="en-GB" sz="1200" dirty="0" err="1"/>
+              <a:t>SalesTerr</a:t>
+            </a:r>
+            <a:r>
+              <a:rPr lang="en-GB" sz="1200" dirty="0"/>
+              <a:t>';</a:t>
+            </a:r>
+            <a:endParaRPr sz="1200" dirty="0"/>
           </a:p>
           <a:p>
             <a:pPr marL="457200" lvl="0" indent="0" algn="l" rtl="0">
@@ -24831,7 +24872,7 @@
               </a:spcAft>
               <a:buNone/>
             </a:pPr>
-            <a:endParaRPr/>
+            <a:endParaRPr dirty="0"/>
           </a:p>
         </p:txBody>
       </p:sp>
@@ -30467,7 +30508,7 @@
               <a:buNone/>
             </a:pPr>
             <a:r>
-              <a:rPr lang="en-GB" sz="1200">
+              <a:rPr lang="en-GB" sz="1200" dirty="0">
                 <a:solidFill>
                   <a:schemeClr val="dk1"/>
                 </a:solidFill>
@@ -30482,7 +30523,7 @@
               <a:t>example uses </a:t>
             </a:r>
             <a:r>
-              <a:rPr lang="en-GB" sz="1100">
+              <a:rPr lang="en-GB" sz="1100" dirty="0">
                 <a:solidFill>
                   <a:schemeClr val="dk1"/>
                 </a:solidFill>
@@ -30490,7 +30531,7 @@
               <a:t>PERCENT</a:t>
             </a:r>
             <a:r>
-              <a:rPr lang="en-GB" sz="1200">
+              <a:rPr lang="en-GB" sz="1200" dirty="0">
                 <a:solidFill>
                   <a:schemeClr val="dk1"/>
                 </a:solidFill>
@@ -30505,7 +30546,7 @@
               <a:t> to specify the number of products returned in the result set. The </a:t>
             </a:r>
             <a:r>
-              <a:rPr lang="en-GB" sz="1100">
+              <a:rPr lang="en-GB" sz="1100" dirty="0" err="1">
                 <a:solidFill>
                   <a:schemeClr val="dk1"/>
                 </a:solidFill>
@@ -30513,7 +30554,7 @@
               <a:t>production.products</a:t>
             </a:r>
             <a:r>
-              <a:rPr lang="en-GB" sz="1200">
+              <a:rPr lang="en-GB" sz="1200" dirty="0">
                 <a:solidFill>
                   <a:schemeClr val="dk1"/>
                 </a:solidFill>
@@ -30528,7 +30569,7 @@
               <a:t> table has </a:t>
             </a:r>
             <a:r>
-              <a:rPr lang="en-GB" sz="1100">
+              <a:rPr lang="en-GB" sz="1100" dirty="0">
                 <a:solidFill>
                   <a:schemeClr val="dk1"/>
                 </a:solidFill>
@@ -30536,7 +30577,7 @@
               <a:t>321</a:t>
             </a:r>
             <a:r>
-              <a:rPr lang="en-GB" sz="1200">
+              <a:rPr lang="en-GB" sz="1200" dirty="0">
                 <a:solidFill>
                   <a:schemeClr val="dk1"/>
                 </a:solidFill>
@@ -30551,7 +30592,7 @@
               <a:t> rows, therefore, one percent of </a:t>
             </a:r>
             <a:r>
-              <a:rPr lang="en-GB" sz="1100">
+              <a:rPr lang="en-GB" sz="1100" dirty="0">
                 <a:solidFill>
                   <a:schemeClr val="dk1"/>
                 </a:solidFill>
@@ -30559,7 +30600,7 @@
               <a:t>321</a:t>
             </a:r>
             <a:r>
-              <a:rPr lang="en-GB" sz="1200">
+              <a:rPr lang="en-GB" sz="1200" dirty="0">
                 <a:solidFill>
                   <a:schemeClr val="dk1"/>
                 </a:solidFill>
@@ -30574,7 +30615,7 @@
               <a:t> is a fraction value ( </a:t>
             </a:r>
             <a:r>
-              <a:rPr lang="en-GB" sz="1100">
+              <a:rPr lang="en-GB" sz="1100" dirty="0">
                 <a:solidFill>
                   <a:schemeClr val="dk1"/>
                 </a:solidFill>
@@ -30582,7 +30623,7 @@
               <a:t>3.21</a:t>
             </a:r>
             <a:r>
-              <a:rPr lang="en-GB" sz="1200">
+              <a:rPr lang="en-GB" sz="1200" dirty="0">
                 <a:solidFill>
                   <a:schemeClr val="dk1"/>
                 </a:solidFill>
@@ -30597,7 +30638,7 @@
               <a:t>), SQL Server rounds it up to the next whole number which is four ( </a:t>
             </a:r>
             <a:r>
-              <a:rPr lang="en-GB" sz="1100">
+              <a:rPr lang="en-GB" sz="1100" dirty="0">
                 <a:solidFill>
                   <a:schemeClr val="dk1"/>
                 </a:solidFill>
@@ -30605,7 +30646,7 @@
               <a:t>4</a:t>
             </a:r>
             <a:r>
-              <a:rPr lang="en-GB" sz="1200">
+              <a:rPr lang="en-GB" sz="1200" dirty="0">
                 <a:solidFill>
                   <a:schemeClr val="dk1"/>
                 </a:solidFill>
@@ -30619,7 +30660,7 @@
               </a:rPr>
               <a:t>) in this case.</a:t>
             </a:r>
-            <a:endParaRPr/>
+            <a:endParaRPr dirty="0"/>
           </a:p>
         </p:txBody>
       </p:sp>
@@ -31129,6 +31170,531 @@
         </p:txBody>
       </p:sp>
     </p:spTree>
+  </p:cSld>
+  <p:clrMapOvr>
+    <a:masterClrMapping/>
+  </p:clrMapOvr>
+</p:sld>
+</file>
+
+<file path=ppt/slides/slide90.xml><?xml version="1.0" encoding="utf-8"?>
+<p:sld xmlns:a="http://schemas.openxmlformats.org/drawingml/2006/main" xmlns:r="http://schemas.openxmlformats.org/officeDocument/2006/relationships" xmlns:p="http://schemas.openxmlformats.org/presentationml/2006/main">
+  <p:cSld>
+    <p:spTree>
+      <p:nvGrpSpPr>
+        <p:cNvPr id="1" name=""/>
+        <p:cNvGrpSpPr/>
+        <p:nvPr/>
+      </p:nvGrpSpPr>
+      <p:grpSpPr>
+        <a:xfrm>
+          <a:off x="0" y="0"/>
+          <a:ext cx="0" cy="0"/>
+          <a:chOff x="0" y="0"/>
+          <a:chExt cx="0" cy="0"/>
+        </a:xfrm>
+      </p:grpSpPr>
+      <p:sp>
+        <p:nvSpPr>
+          <p:cNvPr id="2" name="Title 1">
+            <a:extLst>
+              <a:ext uri="{FF2B5EF4-FFF2-40B4-BE49-F238E27FC236}">
+                <a16:creationId xmlns:a16="http://schemas.microsoft.com/office/drawing/2014/main" id="{EA8A284D-76C8-91FB-A2CD-B26D9575234E}"/>
+              </a:ext>
+            </a:extLst>
+          </p:cNvPr>
+          <p:cNvSpPr>
+            <a:spLocks noGrp="1"/>
+          </p:cNvSpPr>
+          <p:nvPr>
+            <p:ph type="title"/>
+          </p:nvPr>
+        </p:nvSpPr>
+        <p:spPr/>
+        <p:txBody>
+          <a:bodyPr>
+            <a:normAutofit fontScale="90000"/>
+          </a:bodyPr>
+          <a:lstStyle/>
+          <a:p>
+            <a:r>
+              <a:rPr lang="en-IN" dirty="0"/>
+              <a:t>Adding a Check Constraint</a:t>
+            </a:r>
+          </a:p>
+        </p:txBody>
+      </p:sp>
+      <p:sp>
+        <p:nvSpPr>
+          <p:cNvPr id="4" name="Rectangle 1">
+            <a:extLst>
+              <a:ext uri="{FF2B5EF4-FFF2-40B4-BE49-F238E27FC236}">
+                <a16:creationId xmlns:a16="http://schemas.microsoft.com/office/drawing/2014/main" id="{E2EA9C40-1469-1C0E-7077-73680FBC1CC5}"/>
+              </a:ext>
+            </a:extLst>
+          </p:cNvPr>
+          <p:cNvSpPr>
+            <a:spLocks noGrp="1" noChangeArrowheads="1"/>
+          </p:cNvSpPr>
+          <p:nvPr>
+            <p:ph type="body" idx="1"/>
+          </p:nvPr>
+        </p:nvSpPr>
+        <p:spPr bwMode="auto">
+          <a:xfrm>
+            <a:off x="311700" y="1016501"/>
+            <a:ext cx="7083991" cy="1200329"/>
+          </a:xfrm>
+          <a:prstGeom prst="rect">
+            <a:avLst/>
+          </a:prstGeom>
+          <a:solidFill>
+            <a:srgbClr val="FFFFFF"/>
+          </a:solidFill>
+          <a:ln>
+            <a:noFill/>
+          </a:ln>
+          <a:effectLst/>
+          <a:extLst>
+            <a:ext uri="{91240B29-F687-4F45-9708-019B960494DF}">
+              <a14:hiddenLine xmlns:a14="http://schemas.microsoft.com/office/drawing/2010/main" w="9525">
+                <a:solidFill>
+                  <a:schemeClr val="tx1"/>
+                </a:solidFill>
+                <a:miter lim="800000"/>
+                <a:headEnd/>
+                <a:tailEnd/>
+              </a14:hiddenLine>
+            </a:ext>
+            <a:ext uri="{AF507438-7753-43E0-B8FC-AC1667EBCBE1}">
+              <a14:hiddenEffects xmlns:a14="http://schemas.microsoft.com/office/drawing/2010/main">
+                <a:effectLst>
+                  <a:outerShdw dist="35921" dir="2700000" algn="ctr" rotWithShape="0">
+                    <a:schemeClr val="bg2"/>
+                  </a:outerShdw>
+                </a:effectLst>
+              </a14:hiddenEffects>
+            </a:ext>
+          </a:extLst>
+        </p:spPr>
+        <p:txBody>
+          <a:bodyPr vert="horz" wrap="none" lIns="91440" tIns="45720" rIns="91440" bIns="45720" numCol="1" anchor="ctr" anchorCtr="0" compatLnSpc="1">
+            <a:prstTxWarp prst="textNoShape">
+              <a:avLst/>
+            </a:prstTxWarp>
+            <a:spAutoFit/>
+          </a:bodyPr>
+          <a:lstStyle>
+            <a:lvl1pPr eaLnBrk="0" fontAlgn="base" hangingPunct="0">
+              <a:spcBef>
+                <a:spcPct val="0"/>
+              </a:spcBef>
+              <a:spcAft>
+                <a:spcPct val="0"/>
+              </a:spcAft>
+              <a:defRPr>
+                <a:solidFill>
+                  <a:schemeClr val="tx1"/>
+                </a:solidFill>
+                <a:latin typeface="Arial" panose="020B0604020202020204" pitchFamily="34" charset="0"/>
+              </a:defRPr>
+            </a:lvl1pPr>
+            <a:lvl2pPr marL="457200" eaLnBrk="0" fontAlgn="base" hangingPunct="0">
+              <a:spcBef>
+                <a:spcPct val="0"/>
+              </a:spcBef>
+              <a:spcAft>
+                <a:spcPct val="0"/>
+              </a:spcAft>
+              <a:defRPr>
+                <a:solidFill>
+                  <a:schemeClr val="tx1"/>
+                </a:solidFill>
+                <a:latin typeface="Arial" panose="020B0604020202020204" pitchFamily="34" charset="0"/>
+              </a:defRPr>
+            </a:lvl2pPr>
+            <a:lvl3pPr marL="914400" eaLnBrk="0" fontAlgn="base" hangingPunct="0">
+              <a:spcBef>
+                <a:spcPct val="0"/>
+              </a:spcBef>
+              <a:spcAft>
+                <a:spcPct val="0"/>
+              </a:spcAft>
+              <a:defRPr>
+                <a:solidFill>
+                  <a:schemeClr val="tx1"/>
+                </a:solidFill>
+                <a:latin typeface="Arial" panose="020B0604020202020204" pitchFamily="34" charset="0"/>
+              </a:defRPr>
+            </a:lvl3pPr>
+            <a:lvl4pPr marL="1371600" eaLnBrk="0" fontAlgn="base" hangingPunct="0">
+              <a:spcBef>
+                <a:spcPct val="0"/>
+              </a:spcBef>
+              <a:spcAft>
+                <a:spcPct val="0"/>
+              </a:spcAft>
+              <a:defRPr>
+                <a:solidFill>
+                  <a:schemeClr val="tx1"/>
+                </a:solidFill>
+                <a:latin typeface="Arial" panose="020B0604020202020204" pitchFamily="34" charset="0"/>
+              </a:defRPr>
+            </a:lvl4pPr>
+            <a:lvl5pPr marL="1828800" eaLnBrk="0" fontAlgn="base" hangingPunct="0">
+              <a:spcBef>
+                <a:spcPct val="0"/>
+              </a:spcBef>
+              <a:spcAft>
+                <a:spcPct val="0"/>
+              </a:spcAft>
+              <a:defRPr>
+                <a:solidFill>
+                  <a:schemeClr val="tx1"/>
+                </a:solidFill>
+                <a:latin typeface="Arial" panose="020B0604020202020204" pitchFamily="34" charset="0"/>
+              </a:defRPr>
+            </a:lvl5pPr>
+            <a:lvl6pPr marL="2286000" eaLnBrk="0" fontAlgn="base" hangingPunct="0">
+              <a:spcBef>
+                <a:spcPct val="0"/>
+              </a:spcBef>
+              <a:spcAft>
+                <a:spcPct val="0"/>
+              </a:spcAft>
+              <a:defRPr>
+                <a:solidFill>
+                  <a:schemeClr val="tx1"/>
+                </a:solidFill>
+                <a:latin typeface="Arial" panose="020B0604020202020204" pitchFamily="34" charset="0"/>
+              </a:defRPr>
+            </a:lvl6pPr>
+            <a:lvl7pPr marL="2743200" eaLnBrk="0" fontAlgn="base" hangingPunct="0">
+              <a:spcBef>
+                <a:spcPct val="0"/>
+              </a:spcBef>
+              <a:spcAft>
+                <a:spcPct val="0"/>
+              </a:spcAft>
+              <a:defRPr>
+                <a:solidFill>
+                  <a:schemeClr val="tx1"/>
+                </a:solidFill>
+                <a:latin typeface="Arial" panose="020B0604020202020204" pitchFamily="34" charset="0"/>
+              </a:defRPr>
+            </a:lvl7pPr>
+            <a:lvl8pPr marL="3200400" eaLnBrk="0" fontAlgn="base" hangingPunct="0">
+              <a:spcBef>
+                <a:spcPct val="0"/>
+              </a:spcBef>
+              <a:spcAft>
+                <a:spcPct val="0"/>
+              </a:spcAft>
+              <a:defRPr>
+                <a:solidFill>
+                  <a:schemeClr val="tx1"/>
+                </a:solidFill>
+                <a:latin typeface="Arial" panose="020B0604020202020204" pitchFamily="34" charset="0"/>
+              </a:defRPr>
+            </a:lvl8pPr>
+            <a:lvl9pPr marL="3657600" eaLnBrk="0" fontAlgn="base" hangingPunct="0">
+              <a:spcBef>
+                <a:spcPct val="0"/>
+              </a:spcBef>
+              <a:spcAft>
+                <a:spcPct val="0"/>
+              </a:spcAft>
+              <a:defRPr>
+                <a:solidFill>
+                  <a:schemeClr val="tx1"/>
+                </a:solidFill>
+                <a:latin typeface="Arial" panose="020B0604020202020204" pitchFamily="34" charset="0"/>
+              </a:defRPr>
+            </a:lvl9pPr>
+          </a:lstStyle>
+          <a:p>
+            <a:pPr marL="0" marR="0" lvl="0" indent="0" algn="l" defTabSz="914400" rtl="0" eaLnBrk="0" fontAlgn="base" latinLnBrk="0" hangingPunct="0">
+              <a:lnSpc>
+                <a:spcPct val="100000"/>
+              </a:lnSpc>
+              <a:spcBef>
+                <a:spcPct val="0"/>
+              </a:spcBef>
+              <a:spcAft>
+                <a:spcPct val="0"/>
+              </a:spcAft>
+              <a:buClrTx/>
+              <a:buSzTx/>
+              <a:buFontTx/>
+              <a:buNone/>
+              <a:tabLst/>
+            </a:pPr>
+            <a:r>
+              <a:rPr lang="en-US" altLang="en-US" sz="1200" dirty="0">
+                <a:solidFill>
+                  <a:schemeClr val="dk1"/>
+                </a:solidFill>
+                <a:highlight>
+                  <a:srgbClr val="FFFFFF"/>
+                </a:highlight>
+                <a:latin typeface="Roboto"/>
+                <a:ea typeface="Roboto"/>
+              </a:rPr>
+              <a:t>The CHECK constraint is used to limit the value range that can be placed in a column.</a:t>
+            </a:r>
+          </a:p>
+          <a:p>
+            <a:pPr marL="0" marR="0" lvl="0" indent="0" algn="l" defTabSz="914400" rtl="0" eaLnBrk="0" fontAlgn="base" latinLnBrk="0" hangingPunct="0">
+              <a:lnSpc>
+                <a:spcPct val="100000"/>
+              </a:lnSpc>
+              <a:spcBef>
+                <a:spcPct val="0"/>
+              </a:spcBef>
+              <a:spcAft>
+                <a:spcPct val="0"/>
+              </a:spcAft>
+              <a:buClrTx/>
+              <a:buSzTx/>
+              <a:buFontTx/>
+              <a:buNone/>
+              <a:tabLst/>
+            </a:pPr>
+            <a:r>
+              <a:rPr lang="en-US" altLang="en-US" sz="1200" dirty="0">
+                <a:solidFill>
+                  <a:schemeClr val="dk1"/>
+                </a:solidFill>
+                <a:highlight>
+                  <a:srgbClr val="FFFFFF"/>
+                </a:highlight>
+                <a:latin typeface="Roboto"/>
+                <a:ea typeface="Roboto"/>
+              </a:rPr>
+              <a:t>If you define a CHECK constraint on a column it will allow only certain values for this column.</a:t>
+            </a:r>
+          </a:p>
+          <a:p>
+            <a:pPr marL="0" marR="0" lvl="0" indent="0" algn="l" defTabSz="914400" rtl="0" eaLnBrk="0" fontAlgn="base" latinLnBrk="0" hangingPunct="0">
+              <a:lnSpc>
+                <a:spcPct val="100000"/>
+              </a:lnSpc>
+              <a:spcBef>
+                <a:spcPct val="0"/>
+              </a:spcBef>
+              <a:spcAft>
+                <a:spcPct val="0"/>
+              </a:spcAft>
+              <a:buClrTx/>
+              <a:buSzTx/>
+              <a:buFontTx/>
+              <a:buNone/>
+              <a:tabLst/>
+            </a:pPr>
+            <a:r>
+              <a:rPr lang="en-US" altLang="en-US" sz="1200" dirty="0">
+                <a:solidFill>
+                  <a:schemeClr val="dk1"/>
+                </a:solidFill>
+                <a:highlight>
+                  <a:srgbClr val="FFFFFF"/>
+                </a:highlight>
+                <a:latin typeface="Roboto"/>
+                <a:ea typeface="Roboto"/>
+              </a:rPr>
+              <a:t>If you define a CHECK constraint on a table it can limit the values in certain columns based on values </a:t>
+            </a:r>
+          </a:p>
+          <a:p>
+            <a:pPr marL="0" marR="0" lvl="0" indent="0" algn="l" defTabSz="914400" rtl="0" eaLnBrk="0" fontAlgn="base" latinLnBrk="0" hangingPunct="0">
+              <a:lnSpc>
+                <a:spcPct val="100000"/>
+              </a:lnSpc>
+              <a:spcBef>
+                <a:spcPct val="0"/>
+              </a:spcBef>
+              <a:spcAft>
+                <a:spcPct val="0"/>
+              </a:spcAft>
+              <a:buClrTx/>
+              <a:buSzTx/>
+              <a:buFontTx/>
+              <a:buNone/>
+              <a:tabLst/>
+            </a:pPr>
+            <a:r>
+              <a:rPr lang="en-US" altLang="en-US" sz="1200" dirty="0">
+                <a:solidFill>
+                  <a:schemeClr val="dk1"/>
+                </a:solidFill>
+                <a:highlight>
+                  <a:srgbClr val="FFFFFF"/>
+                </a:highlight>
+                <a:latin typeface="Roboto"/>
+                <a:ea typeface="Roboto"/>
+              </a:rPr>
+              <a:t>in other columns in the row.</a:t>
+            </a:r>
+          </a:p>
+          <a:p>
+            <a:pPr marL="0" marR="0" lvl="0" indent="0" algn="l" defTabSz="914400" rtl="0" eaLnBrk="0" fontAlgn="base" latinLnBrk="0" hangingPunct="0">
+              <a:lnSpc>
+                <a:spcPct val="100000"/>
+              </a:lnSpc>
+              <a:spcBef>
+                <a:spcPct val="0"/>
+              </a:spcBef>
+              <a:spcAft>
+                <a:spcPct val="0"/>
+              </a:spcAft>
+              <a:buClrTx/>
+              <a:buSzTx/>
+              <a:buFontTx/>
+              <a:buNone/>
+              <a:tabLst/>
+            </a:pPr>
+            <a:endParaRPr lang="en-US" altLang="en-US" sz="1200" dirty="0">
+              <a:solidFill>
+                <a:schemeClr val="dk1"/>
+              </a:solidFill>
+              <a:highlight>
+                <a:srgbClr val="FFFFFF"/>
+              </a:highlight>
+              <a:latin typeface="Roboto"/>
+              <a:ea typeface="Roboto"/>
+            </a:endParaRPr>
+          </a:p>
+          <a:p>
+            <a:pPr marL="0" marR="0" lvl="0" indent="0" algn="l" defTabSz="914400" rtl="0" eaLnBrk="0" fontAlgn="base" latinLnBrk="0" hangingPunct="0">
+              <a:lnSpc>
+                <a:spcPct val="100000"/>
+              </a:lnSpc>
+              <a:spcBef>
+                <a:spcPct val="0"/>
+              </a:spcBef>
+              <a:spcAft>
+                <a:spcPct val="0"/>
+              </a:spcAft>
+              <a:buClrTx/>
+              <a:buSzTx/>
+              <a:buFontTx/>
+              <a:buNone/>
+              <a:tabLst/>
+            </a:pPr>
+            <a:endParaRPr lang="en-US" altLang="en-US" sz="1200" dirty="0">
+              <a:solidFill>
+                <a:schemeClr val="dk1"/>
+              </a:solidFill>
+              <a:highlight>
+                <a:srgbClr val="FFFFFF"/>
+              </a:highlight>
+              <a:latin typeface="Roboto"/>
+              <a:ea typeface="Roboto"/>
+            </a:endParaRPr>
+          </a:p>
+        </p:txBody>
+      </p:sp>
+      <p:pic>
+        <p:nvPicPr>
+          <p:cNvPr id="6" name="Picture 5">
+            <a:extLst>
+              <a:ext uri="{FF2B5EF4-FFF2-40B4-BE49-F238E27FC236}">
+                <a16:creationId xmlns:a16="http://schemas.microsoft.com/office/drawing/2014/main" id="{AED1E52C-CCD1-4079-F048-B507649EC1BD}"/>
+              </a:ext>
+            </a:extLst>
+          </p:cNvPr>
+          <p:cNvPicPr>
+            <a:picLocks noChangeAspect="1"/>
+          </p:cNvPicPr>
+          <p:nvPr/>
+        </p:nvPicPr>
+        <p:blipFill>
+          <a:blip r:embed="rId2"/>
+          <a:stretch>
+            <a:fillRect/>
+          </a:stretch>
+        </p:blipFill>
+        <p:spPr>
+          <a:xfrm>
+            <a:off x="494635" y="2788306"/>
+            <a:ext cx="2838450" cy="1381125"/>
+          </a:xfrm>
+          <a:prstGeom prst="rect">
+            <a:avLst/>
+          </a:prstGeom>
+        </p:spPr>
+      </p:pic>
+      <p:sp>
+        <p:nvSpPr>
+          <p:cNvPr id="7" name="TextBox 6">
+            <a:extLst>
+              <a:ext uri="{FF2B5EF4-FFF2-40B4-BE49-F238E27FC236}">
+                <a16:creationId xmlns:a16="http://schemas.microsoft.com/office/drawing/2014/main" id="{999BD36A-3CFF-F9F6-C9D2-E76F9C054287}"/>
+              </a:ext>
+            </a:extLst>
+          </p:cNvPr>
+          <p:cNvSpPr txBox="1"/>
+          <p:nvPr/>
+        </p:nvSpPr>
+        <p:spPr>
+          <a:xfrm>
+            <a:off x="457200" y="1988288"/>
+            <a:ext cx="3062177" cy="307777"/>
+          </a:xfrm>
+          <a:prstGeom prst="rect">
+            <a:avLst/>
+          </a:prstGeom>
+          <a:noFill/>
+        </p:spPr>
+        <p:txBody>
+          <a:bodyPr wrap="square" rtlCol="0">
+            <a:spAutoFit/>
+          </a:bodyPr>
+          <a:lstStyle/>
+          <a:p>
+            <a:r>
+              <a:rPr lang="en-IN" b="1" dirty="0"/>
+              <a:t>Example of CHECK Constraint</a:t>
+            </a:r>
+          </a:p>
+        </p:txBody>
+      </p:sp>
+      <p:pic>
+        <p:nvPicPr>
+          <p:cNvPr id="9" name="Picture 8">
+            <a:extLst>
+              <a:ext uri="{FF2B5EF4-FFF2-40B4-BE49-F238E27FC236}">
+                <a16:creationId xmlns:a16="http://schemas.microsoft.com/office/drawing/2014/main" id="{71B638C0-CBC5-06D7-9EF0-DD4273167C6D}"/>
+              </a:ext>
+            </a:extLst>
+          </p:cNvPr>
+          <p:cNvPicPr>
+            <a:picLocks noChangeAspect="1"/>
+          </p:cNvPicPr>
+          <p:nvPr/>
+        </p:nvPicPr>
+        <p:blipFill>
+          <a:blip r:embed="rId3"/>
+          <a:stretch>
+            <a:fillRect/>
+          </a:stretch>
+        </p:blipFill>
+        <p:spPr>
+          <a:xfrm>
+            <a:off x="3674213" y="2571749"/>
+            <a:ext cx="4857750" cy="1800225"/>
+          </a:xfrm>
+          <a:prstGeom prst="rect">
+            <a:avLst/>
+          </a:prstGeom>
+        </p:spPr>
+      </p:pic>
+    </p:spTree>
+    <p:extLst>
+      <p:ext uri="{BB962C8B-B14F-4D97-AF65-F5344CB8AC3E}">
+        <p14:creationId xmlns:p14="http://schemas.microsoft.com/office/powerpoint/2010/main" val="470397460"/>
+      </p:ext>
+    </p:extLst>
   </p:cSld>
   <p:clrMapOvr>
     <a:masterClrMapping/>

</xml_diff>

<commit_message>
added sql aggregate functions
</commit_message>
<xml_diff>
--- a/IIHT-Capgemini Big Data Azure Training-Slide.pptx
+++ b/IIHT-Capgemini Big Data Azure Training-Slide.pptx
@@ -6345,7 +6345,7 @@
         </p:nvSpPr>
         <p:spPr>
           <a:xfrm>
-            <a:off x="381300" y="685800"/>
+            <a:off x="381000" y="685800"/>
             <a:ext cx="6096000" cy="3429000"/>
           </a:xfrm>
           <a:custGeom>
@@ -24464,10 +24464,10 @@
               <a:buNone/>
             </a:pPr>
             <a:r>
-              <a:rPr lang="en-GB"/>
-              <a:t>Important SQL Commands (DDL) </a:t>
-            </a:r>
-            <a:endParaRPr/>
+              <a:rPr lang="en-GB" dirty="0"/>
+              <a:t>Important SQL Commands (DML) </a:t>
+            </a:r>
+            <a:endParaRPr dirty="0"/>
           </a:p>
         </p:txBody>
       </p:sp>
@@ -24507,10 +24507,10 @@
               <a:buChar char="●"/>
             </a:pPr>
             <a:r>
-              <a:rPr lang="en-GB"/>
+              <a:rPr lang="en-GB" dirty="0"/>
               <a:t>SELECT - extracts data from a database </a:t>
             </a:r>
-            <a:endParaRPr/>
+            <a:endParaRPr dirty="0"/>
           </a:p>
           <a:p>
             <a:pPr marL="457200" lvl="0" indent="-342900" algn="l" rtl="0">
@@ -24524,10 +24524,10 @@
               <a:buChar char="●"/>
             </a:pPr>
             <a:r>
-              <a:rPr lang="en-GB"/>
+              <a:rPr lang="en-GB" dirty="0"/>
               <a:t>UPDATE - updates data in a database </a:t>
             </a:r>
-            <a:endParaRPr/>
+            <a:endParaRPr dirty="0"/>
           </a:p>
           <a:p>
             <a:pPr marL="457200" lvl="0" indent="-342900" algn="l" rtl="0">
@@ -24541,10 +24541,10 @@
               <a:buChar char="●"/>
             </a:pPr>
             <a:r>
-              <a:rPr lang="en-GB"/>
+              <a:rPr lang="en-GB" dirty="0"/>
               <a:t>DELETE - deletes data from a database </a:t>
             </a:r>
-            <a:endParaRPr/>
+            <a:endParaRPr dirty="0"/>
           </a:p>
           <a:p>
             <a:pPr marL="457200" lvl="0" indent="-342900" algn="l" rtl="0">
@@ -24558,10 +24558,10 @@
               <a:buChar char="●"/>
             </a:pPr>
             <a:r>
-              <a:rPr lang="en-GB"/>
+              <a:rPr lang="en-GB" dirty="0"/>
               <a:t>INSERT INTO - inserts new data into a database</a:t>
             </a:r>
-            <a:endParaRPr/>
+            <a:endParaRPr dirty="0"/>
           </a:p>
           <a:p>
             <a:pPr marL="457200" lvl="0" indent="-342900" algn="l" rtl="0">
@@ -24575,10 +24575,10 @@
               <a:buChar char="●"/>
             </a:pPr>
             <a:r>
-              <a:rPr lang="en-GB"/>
+              <a:rPr lang="en-GB" dirty="0"/>
               <a:t>CREATE DATABASE - creates a new database </a:t>
             </a:r>
-            <a:endParaRPr/>
+            <a:endParaRPr dirty="0"/>
           </a:p>
         </p:txBody>
       </p:sp>
@@ -24642,10 +24642,10 @@
               <a:buNone/>
             </a:pPr>
             <a:r>
-              <a:rPr lang="en-GB"/>
-              <a:t>SQL Command (DML)</a:t>
-            </a:r>
-            <a:endParaRPr/>
+              <a:rPr lang="en-GB" dirty="0"/>
+              <a:t>SQL Command (DDL)</a:t>
+            </a:r>
+            <a:endParaRPr dirty="0"/>
           </a:p>
         </p:txBody>
       </p:sp>

</xml_diff>